<commit_message>
Version 2: color coding and update screenshots
</commit_message>
<xml_diff>
--- a/chep2016-lhcbpr-posterA0-v1.pptx
+++ b/chep2016-lhcbpr-posterA0-v1.pptx
@@ -4800,13 +4800,7 @@
               <a:rPr lang="en-US" sz="2800" b="1" dirty="0" smtClean="0">
                 <a:latin typeface="+mn-lt"/>
               </a:rPr>
-              <a:t>Main use </a:t>
-            </a:r>
-            <a:r>
-              <a:rPr lang="en-US" sz="2800" b="1" dirty="0" smtClean="0">
-                <a:latin typeface="+mn-lt"/>
-              </a:rPr>
-              <a:t>cases</a:t>
+              <a:t>Main use cases</a:t>
             </a:r>
           </a:p>
           <a:p>
@@ -4855,9 +4849,6 @@
               </a:rPr>
               <a:t>.</a:t>
             </a:r>
-            <a:endParaRPr lang="en-US" sz="2800" dirty="0" smtClean="0">
-              <a:latin typeface="+mn-lt"/>
-            </a:endParaRPr>
           </a:p>
           <a:p>
             <a:pPr marL="900000" indent="-457200">
@@ -4899,13 +4890,7 @@
               <a:rPr lang="en-US" sz="2800" dirty="0" smtClean="0">
                 <a:latin typeface="+mn-lt"/>
               </a:rPr>
-              <a:t>Versions of </a:t>
-            </a:r>
-            <a:r>
-              <a:rPr lang="en-US" sz="2800" dirty="0" smtClean="0">
-                <a:latin typeface="+mn-lt"/>
-              </a:rPr>
-              <a:t>application</a:t>
+              <a:t>Versions of application</a:t>
             </a:r>
           </a:p>
           <a:p>
@@ -4919,9 +4904,6 @@
               </a:rPr>
               <a:t>Compiler versions</a:t>
             </a:r>
-            <a:endParaRPr lang="en-US" sz="2800" dirty="0" smtClean="0">
-              <a:latin typeface="+mn-lt"/>
-            </a:endParaRPr>
           </a:p>
           <a:p>
             <a:pPr marL="900000" indent="-457200">
@@ -5707,9 +5689,463 @@
           </a:p>
         </p:txBody>
       </p:sp>
+      <p:sp>
+        <p:nvSpPr>
+          <p:cNvPr id="26" name="TextBox 25"/>
+          <p:cNvSpPr txBox="1"/>
+          <p:nvPr/>
+        </p:nvSpPr>
+        <p:spPr>
+          <a:xfrm>
+            <a:off x="10631488" y="30465172"/>
+            <a:ext cx="7972738" cy="4524315"/>
+          </a:xfrm>
+          <a:prstGeom prst="rect">
+            <a:avLst/>
+          </a:prstGeom>
+          <a:noFill/>
+        </p:spPr>
+        <p:txBody>
+          <a:bodyPr wrap="square" rtlCol="0">
+            <a:spAutoFit/>
+          </a:bodyPr>
+          <a:lstStyle/>
+          <a:p>
+            <a:pPr marL="900000" indent="-342900">
+              <a:buFont typeface="Arial" charset="0"/>
+              <a:buChar char="•"/>
+            </a:pPr>
+            <a:r>
+              <a:rPr lang="en-US" b="1" dirty="0" smtClean="0">
+                <a:latin typeface="+mn-lt"/>
+              </a:rPr>
+              <a:t>Docker</a:t>
+            </a:r>
+            <a:r>
+              <a:rPr lang="en-US" dirty="0" smtClean="0">
+                <a:latin typeface="+mn-lt"/>
+              </a:rPr>
+              <a:t> is used to manage applications’ containers and </a:t>
+            </a:r>
+            <a:r>
+              <a:rPr lang="en-US" b="1" dirty="0" smtClean="0">
+                <a:latin typeface="+mn-lt"/>
+              </a:rPr>
+              <a:t>docker-compose</a:t>
+            </a:r>
+            <a:r>
+              <a:rPr lang="en-US" dirty="0" smtClean="0">
+                <a:latin typeface="+mn-lt"/>
+              </a:rPr>
+              <a:t> is used for orchestrate containers in different environments.</a:t>
+            </a:r>
+            <a:endParaRPr lang="ru-RU" dirty="0" smtClean="0">
+              <a:latin typeface="+mn-lt"/>
+            </a:endParaRPr>
+          </a:p>
+          <a:p>
+            <a:pPr marL="900000" indent="-342900">
+              <a:buFont typeface="Arial" charset="0"/>
+              <a:buChar char="•"/>
+            </a:pPr>
+            <a:r>
+              <a:rPr lang="en-US" dirty="0" smtClean="0">
+                <a:latin typeface="+mn-lt"/>
+              </a:rPr>
+              <a:t>The same applications’ images are used for </a:t>
+            </a:r>
+            <a:r>
+              <a:rPr lang="en-US" b="1" dirty="0" smtClean="0">
+                <a:latin typeface="+mn-lt"/>
+              </a:rPr>
+              <a:t>production</a:t>
+            </a:r>
+            <a:r>
+              <a:rPr lang="en-US" dirty="0" smtClean="0">
+                <a:latin typeface="+mn-lt"/>
+              </a:rPr>
+              <a:t> and </a:t>
+            </a:r>
+            <a:r>
+              <a:rPr lang="en-US" b="1" dirty="0" smtClean="0">
+                <a:latin typeface="+mn-lt"/>
+              </a:rPr>
+              <a:t>development</a:t>
+            </a:r>
+            <a:r>
+              <a:rPr lang="en-US" dirty="0" smtClean="0">
+                <a:latin typeface="+mn-lt"/>
+              </a:rPr>
+              <a:t> </a:t>
+            </a:r>
+            <a:r>
+              <a:rPr lang="en-US" dirty="0">
+                <a:latin typeface="+mn-lt"/>
+              </a:rPr>
+              <a:t>environments that </a:t>
+            </a:r>
+            <a:r>
+              <a:rPr lang="en-US" dirty="0" smtClean="0">
+                <a:latin typeface="+mn-lt"/>
+              </a:rPr>
+              <a:t>allow quickly </a:t>
+            </a:r>
+            <a:r>
+              <a:rPr lang="en-US" dirty="0">
+                <a:latin typeface="+mn-lt"/>
+              </a:rPr>
+              <a:t>test and deploy </a:t>
+            </a:r>
+            <a:r>
+              <a:rPr lang="en-US" dirty="0" smtClean="0">
+                <a:latin typeface="+mn-lt"/>
+              </a:rPr>
+              <a:t>new versions of services.</a:t>
+            </a:r>
+          </a:p>
+          <a:p>
+            <a:pPr marL="900000" indent="-342900">
+              <a:buFont typeface="Arial" charset="0"/>
+              <a:buChar char="•"/>
+            </a:pPr>
+            <a:r>
+              <a:rPr lang="en-US" dirty="0" smtClean="0">
+                <a:latin typeface="+mn-lt"/>
+              </a:rPr>
+              <a:t>Images </a:t>
+            </a:r>
+            <a:r>
+              <a:rPr lang="en-US" dirty="0">
+                <a:latin typeface="+mn-lt"/>
+              </a:rPr>
+              <a:t>are p</a:t>
+            </a:r>
+            <a:r>
+              <a:rPr lang="en-US" dirty="0" smtClean="0">
+                <a:latin typeface="+mn-lt"/>
+              </a:rPr>
+              <a:t>ublicly accessible at the </a:t>
+            </a:r>
+            <a:r>
+              <a:rPr lang="en-US" b="1" dirty="0" smtClean="0">
+                <a:latin typeface="+mn-lt"/>
+              </a:rPr>
+              <a:t>Docker Hub </a:t>
+            </a:r>
+            <a:r>
+              <a:rPr lang="en-US" dirty="0" smtClean="0">
+                <a:latin typeface="+mn-lt"/>
+              </a:rPr>
+              <a:t>registry.</a:t>
+            </a:r>
+            <a:endParaRPr lang="ru-RU" dirty="0" smtClean="0">
+              <a:latin typeface="+mn-lt"/>
+            </a:endParaRPr>
+          </a:p>
+          <a:p>
+            <a:pPr marL="900000" indent="-342900">
+              <a:buFont typeface="Arial" charset="0"/>
+              <a:buChar char="•"/>
+            </a:pPr>
+            <a:r>
+              <a:rPr lang="en-US" dirty="0" smtClean="0">
+                <a:latin typeface="+mn-lt"/>
+              </a:rPr>
+              <a:t>Current infrastructure relies on </a:t>
+            </a:r>
+            <a:r>
+              <a:rPr lang="en-US" b="1" dirty="0" smtClean="0">
+                <a:latin typeface="+mn-lt"/>
+              </a:rPr>
+              <a:t>CERN services </a:t>
+            </a:r>
+            <a:r>
+              <a:rPr lang="en-US" dirty="0" smtClean="0">
+                <a:latin typeface="+mn-lt"/>
+              </a:rPr>
+              <a:t>like OpenStack Cloud, Database On Demand and</a:t>
+            </a:r>
+            <a:r>
+              <a:rPr lang="ru-RU" dirty="0" smtClean="0">
+                <a:latin typeface="+mn-lt"/>
+              </a:rPr>
+              <a:t> </a:t>
+            </a:r>
+            <a:r>
+              <a:rPr lang="en-US" dirty="0" smtClean="0">
+                <a:latin typeface="+mn-lt"/>
+              </a:rPr>
+              <a:t>Foreman for control virtual machines</a:t>
+            </a:r>
+            <a:endParaRPr lang="en-US" dirty="0">
+              <a:latin typeface="+mn-lt"/>
+            </a:endParaRPr>
+          </a:p>
+        </p:txBody>
+      </p:sp>
+      <p:sp>
+        <p:nvSpPr>
+          <p:cNvPr id="27" name="TextBox 26"/>
+          <p:cNvSpPr txBox="1"/>
+          <p:nvPr/>
+        </p:nvSpPr>
+        <p:spPr>
+          <a:xfrm>
+            <a:off x="24259597" y="28626565"/>
+            <a:ext cx="5663508" cy="5632311"/>
+          </a:xfrm>
+          <a:prstGeom prst="rect">
+            <a:avLst/>
+          </a:prstGeom>
+          <a:solidFill>
+            <a:srgbClr val="E6BB2F"/>
+          </a:solidFill>
+        </p:spPr>
+        <p:txBody>
+          <a:bodyPr wrap="square" rtlCol="0">
+            <a:spAutoFit/>
+          </a:bodyPr>
+          <a:lstStyle/>
+          <a:p>
+            <a:pPr marL="900000" indent="-342900">
+              <a:buFont typeface="Arial" charset="0"/>
+              <a:buChar char="•"/>
+            </a:pPr>
+            <a:r>
+              <a:rPr lang="en-US" dirty="0" smtClean="0">
+                <a:latin typeface="+mn-lt"/>
+              </a:rPr>
+              <a:t>Web frontend is a javascript single-page application that is composed of </a:t>
+            </a:r>
+            <a:r>
+              <a:rPr lang="en-US" b="1" dirty="0" smtClean="0">
+                <a:latin typeface="+mn-lt"/>
+              </a:rPr>
+              <a:t>analysis modules </a:t>
+            </a:r>
+            <a:r>
+              <a:rPr lang="en-US" dirty="0" smtClean="0">
+                <a:latin typeface="+mn-lt"/>
+              </a:rPr>
+              <a:t>for presenting specific logic and views for inspecting test results.</a:t>
+            </a:r>
+          </a:p>
+          <a:p>
+            <a:pPr marL="900000" indent="-342900">
+              <a:buFont typeface="Arial" charset="0"/>
+              <a:buChar char="•"/>
+            </a:pPr>
+            <a:r>
+              <a:rPr lang="en-US" dirty="0" smtClean="0">
+                <a:latin typeface="+mn-lt"/>
+              </a:rPr>
+              <a:t>Each analysis module is an </a:t>
+            </a:r>
+            <a:r>
+              <a:rPr lang="en-US" b="1" dirty="0" smtClean="0">
+                <a:latin typeface="+mn-lt"/>
+              </a:rPr>
+              <a:t>application extension </a:t>
+            </a:r>
+            <a:r>
+              <a:rPr lang="en-US" dirty="0" smtClean="0">
+                <a:latin typeface="+mn-lt"/>
+              </a:rPr>
+              <a:t>and can be simply added or removed without  breaking the main application</a:t>
+            </a:r>
+          </a:p>
+          <a:p>
+            <a:pPr marL="900000" indent="-342900">
+              <a:buFont typeface="Arial" charset="0"/>
+              <a:buChar char="•"/>
+            </a:pPr>
+            <a:r>
+              <a:rPr lang="en-US" dirty="0" smtClean="0">
+                <a:latin typeface="+mn-lt"/>
+              </a:rPr>
+              <a:t>Common </a:t>
+            </a:r>
+            <a:r>
+              <a:rPr lang="en-US" b="1" dirty="0" smtClean="0">
+                <a:latin typeface="+mn-lt"/>
+              </a:rPr>
+              <a:t>web components </a:t>
+            </a:r>
+            <a:r>
+              <a:rPr lang="en-US" dirty="0" smtClean="0">
+                <a:latin typeface="+mn-lt"/>
+              </a:rPr>
+              <a:t>are provided for building modules. For example, search jobs and draw histograms.</a:t>
+            </a:r>
+          </a:p>
+          <a:p>
+            <a:pPr marL="342900" indent="-342900">
+              <a:buFont typeface="Arial" charset="0"/>
+              <a:buChar char="•"/>
+            </a:pPr>
+            <a:endParaRPr lang="en-US" dirty="0">
+              <a:latin typeface="+mn-lt"/>
+            </a:endParaRPr>
+          </a:p>
+        </p:txBody>
+      </p:sp>
+      <p:sp>
+        <p:nvSpPr>
+          <p:cNvPr id="122" name="Text Box 7"/>
+          <p:cNvSpPr txBox="1">
+            <a:spLocks noChangeArrowheads="1"/>
+          </p:cNvSpPr>
+          <p:nvPr/>
+        </p:nvSpPr>
+        <p:spPr bwMode="auto">
+          <a:xfrm>
+            <a:off x="982662" y="35559203"/>
+            <a:ext cx="17974467" cy="1496473"/>
+          </a:xfrm>
+          <a:prstGeom prst="rect">
+            <a:avLst/>
+          </a:prstGeom>
+          <a:solidFill>
+            <a:schemeClr val="hlink"/>
+          </a:solidFill>
+          <a:ln w="9525">
+            <a:noFill/>
+            <a:miter lim="800000"/>
+            <a:headEnd/>
+            <a:tailEnd/>
+          </a:ln>
+        </p:spPr>
+        <p:txBody>
+          <a:bodyPr wrap="square" lIns="360000" tIns="360000" rIns="360000" bIns="360000">
+            <a:spAutoFit/>
+          </a:bodyPr>
+          <a:lstStyle/>
+          <a:p>
+            <a:pPr eaLnBrk="0" hangingPunct="0">
+              <a:spcBef>
+                <a:spcPct val="50000"/>
+              </a:spcBef>
+            </a:pPr>
+            <a:r>
+              <a:rPr lang="en-US" sz="5000" b="1" dirty="0">
+                <a:solidFill>
+                  <a:schemeClr val="bg1"/>
+                </a:solidFill>
+                <a:latin typeface="Arial" charset="0"/>
+              </a:rPr>
+              <a:t>6</a:t>
+            </a:r>
+            <a:r>
+              <a:rPr lang="en-US" sz="5000" b="1" dirty="0" smtClean="0">
+                <a:solidFill>
+                  <a:schemeClr val="bg1"/>
+                </a:solidFill>
+                <a:latin typeface="Arial" charset="0"/>
+              </a:rPr>
+              <a:t>. API Service</a:t>
+            </a:r>
+            <a:endParaRPr lang="en-US" sz="5000" b="1" dirty="0">
+              <a:solidFill>
+                <a:schemeClr val="bg1"/>
+              </a:solidFill>
+              <a:latin typeface="Arial" charset="0"/>
+            </a:endParaRPr>
+          </a:p>
+        </p:txBody>
+      </p:sp>
+      <p:sp>
+        <p:nvSpPr>
+          <p:cNvPr id="124" name="TextBox 123"/>
+          <p:cNvSpPr txBox="1"/>
+          <p:nvPr/>
+        </p:nvSpPr>
+        <p:spPr>
+          <a:xfrm>
+            <a:off x="982663" y="37054152"/>
+            <a:ext cx="17974466" cy="5940000"/>
+          </a:xfrm>
+          <a:prstGeom prst="rect">
+            <a:avLst/>
+          </a:prstGeom>
+          <a:solidFill>
+            <a:srgbClr val="49C9CD"/>
+          </a:solidFill>
+        </p:spPr>
+        <p:txBody>
+          <a:bodyPr wrap="square" rtlCol="0" anchor="t">
+            <a:spAutoFit/>
+          </a:bodyPr>
+          <a:lstStyle/>
+          <a:p>
+            <a:endParaRPr lang="en-US" sz="2800" dirty="0" smtClean="0">
+              <a:latin typeface="+mn-lt"/>
+            </a:endParaRPr>
+          </a:p>
+          <a:p>
+            <a:endParaRPr lang="en-US" sz="2800" dirty="0">
+              <a:latin typeface="+mn-lt"/>
+            </a:endParaRPr>
+          </a:p>
+          <a:p>
+            <a:endParaRPr lang="en-US" sz="2800" dirty="0" smtClean="0">
+              <a:latin typeface="+mn-lt"/>
+            </a:endParaRPr>
+          </a:p>
+          <a:p>
+            <a:endParaRPr lang="en-US" sz="2800" dirty="0">
+              <a:latin typeface="+mn-lt"/>
+            </a:endParaRPr>
+          </a:p>
+          <a:p>
+            <a:endParaRPr lang="en-US" sz="2800" dirty="0" smtClean="0">
+              <a:latin typeface="+mn-lt"/>
+            </a:endParaRPr>
+          </a:p>
+          <a:p>
+            <a:endParaRPr lang="en-US" sz="2800" dirty="0">
+              <a:latin typeface="+mn-lt"/>
+            </a:endParaRPr>
+          </a:p>
+          <a:p>
+            <a:endParaRPr lang="en-US" sz="2800" dirty="0" smtClean="0">
+              <a:latin typeface="+mn-lt"/>
+            </a:endParaRPr>
+          </a:p>
+          <a:p>
+            <a:endParaRPr lang="en-US" sz="2800" dirty="0">
+              <a:latin typeface="+mn-lt"/>
+            </a:endParaRPr>
+          </a:p>
+          <a:p>
+            <a:endParaRPr lang="en-US" sz="2800" dirty="0" smtClean="0">
+              <a:latin typeface="+mn-lt"/>
+            </a:endParaRPr>
+          </a:p>
+          <a:p>
+            <a:endParaRPr lang="en-US" sz="2800" dirty="0">
+              <a:latin typeface="+mn-lt"/>
+            </a:endParaRPr>
+          </a:p>
+          <a:p>
+            <a:endParaRPr lang="en-US" sz="2800" dirty="0" smtClean="0">
+              <a:latin typeface="+mn-lt"/>
+            </a:endParaRPr>
+          </a:p>
+          <a:p>
+            <a:endParaRPr lang="en-US" sz="2800" dirty="0">
+              <a:latin typeface="+mn-lt"/>
+            </a:endParaRPr>
+          </a:p>
+          <a:p>
+            <a:endParaRPr lang="ru-RU" sz="2800" dirty="0" smtClean="0">
+              <a:latin typeface="+mn-lt"/>
+            </a:endParaRPr>
+          </a:p>
+        </p:txBody>
+      </p:sp>
       <p:pic>
         <p:nvPicPr>
-          <p:cNvPr id="20" name="Picture 19"/>
+          <p:cNvPr id="28" name="Picture 27"/>
           <p:cNvPicPr>
             <a:picLocks noChangeAspect="1"/>
           </p:cNvPicPr>
@@ -5729,544 +6165,6 @@
         </p:blipFill>
         <p:spPr>
           <a:xfrm>
-            <a:off x="19391310" y="22197472"/>
-            <a:ext cx="10493695" cy="3479193"/>
-          </a:xfrm>
-          <a:prstGeom prst="rect">
-            <a:avLst/>
-          </a:prstGeom>
-        </p:spPr>
-      </p:pic>
-      <p:pic>
-        <p:nvPicPr>
-          <p:cNvPr id="22" name="Picture 21"/>
-          <p:cNvPicPr>
-            <a:picLocks noChangeAspect="1"/>
-          </p:cNvPicPr>
-          <p:nvPr/>
-        </p:nvPicPr>
-        <p:blipFill>
-          <a:blip r:embed="rId8">
-            <a:extLst>
-              <a:ext uri="{28A0092B-C50C-407E-A947-70E740481C1C}">
-                <a14:useLocalDpi xmlns:a14="http://schemas.microsoft.com/office/drawing/2010/main" val="0"/>
-              </a:ext>
-            </a:extLst>
-          </a:blip>
-          <a:stretch>
-            <a:fillRect/>
-          </a:stretch>
-        </p:blipFill>
-        <p:spPr>
-          <a:xfrm>
-            <a:off x="19814333" y="25958003"/>
-            <a:ext cx="7507627" cy="6041466"/>
-          </a:xfrm>
-          <a:prstGeom prst="rect">
-            <a:avLst/>
-          </a:prstGeom>
-        </p:spPr>
-      </p:pic>
-      <p:sp>
-        <p:nvSpPr>
-          <p:cNvPr id="26" name="TextBox 25"/>
-          <p:cNvSpPr txBox="1"/>
-          <p:nvPr/>
-        </p:nvSpPr>
-        <p:spPr>
-          <a:xfrm>
-            <a:off x="10631488" y="30465172"/>
-            <a:ext cx="7972738" cy="4524315"/>
-          </a:xfrm>
-          <a:prstGeom prst="rect">
-            <a:avLst/>
-          </a:prstGeom>
-          <a:noFill/>
-        </p:spPr>
-        <p:txBody>
-          <a:bodyPr wrap="square" rtlCol="0">
-            <a:spAutoFit/>
-          </a:bodyPr>
-          <a:lstStyle/>
-          <a:p>
-            <a:pPr marL="900000" indent="-342900">
-              <a:buFont typeface="Arial" charset="0"/>
-              <a:buChar char="•"/>
-            </a:pPr>
-            <a:r>
-              <a:rPr lang="en-US" b="1" dirty="0" smtClean="0">
-                <a:latin typeface="+mn-lt"/>
-              </a:rPr>
-              <a:t>Docker</a:t>
-            </a:r>
-            <a:r>
-              <a:rPr lang="en-US" dirty="0" smtClean="0">
-                <a:latin typeface="+mn-lt"/>
-              </a:rPr>
-              <a:t> is used to manage applications’ containers and </a:t>
-            </a:r>
-            <a:r>
-              <a:rPr lang="en-US" b="1" dirty="0" smtClean="0">
-                <a:latin typeface="+mn-lt"/>
-              </a:rPr>
-              <a:t>docker-compose</a:t>
-            </a:r>
-            <a:r>
-              <a:rPr lang="en-US" dirty="0" smtClean="0">
-                <a:latin typeface="+mn-lt"/>
-              </a:rPr>
-              <a:t> is used for orchestrate containers in different environments.</a:t>
-            </a:r>
-            <a:endParaRPr lang="ru-RU" dirty="0" smtClean="0">
-              <a:latin typeface="+mn-lt"/>
-            </a:endParaRPr>
-          </a:p>
-          <a:p>
-            <a:pPr marL="900000" indent="-342900">
-              <a:buFont typeface="Arial" charset="0"/>
-              <a:buChar char="•"/>
-            </a:pPr>
-            <a:r>
-              <a:rPr lang="en-US" dirty="0" smtClean="0">
-                <a:latin typeface="+mn-lt"/>
-              </a:rPr>
-              <a:t>The same applications’ images are used for </a:t>
-            </a:r>
-            <a:r>
-              <a:rPr lang="en-US" b="1" dirty="0" smtClean="0">
-                <a:latin typeface="+mn-lt"/>
-              </a:rPr>
-              <a:t>production</a:t>
-            </a:r>
-            <a:r>
-              <a:rPr lang="en-US" dirty="0" smtClean="0">
-                <a:latin typeface="+mn-lt"/>
-              </a:rPr>
-              <a:t> and </a:t>
-            </a:r>
-            <a:r>
-              <a:rPr lang="en-US" b="1" dirty="0" smtClean="0">
-                <a:latin typeface="+mn-lt"/>
-              </a:rPr>
-              <a:t>development</a:t>
-            </a:r>
-            <a:r>
-              <a:rPr lang="en-US" dirty="0" smtClean="0">
-                <a:latin typeface="+mn-lt"/>
-              </a:rPr>
-              <a:t> </a:t>
-            </a:r>
-            <a:r>
-              <a:rPr lang="en-US" dirty="0">
-                <a:latin typeface="+mn-lt"/>
-              </a:rPr>
-              <a:t>environments that </a:t>
-            </a:r>
-            <a:r>
-              <a:rPr lang="en-US" dirty="0" smtClean="0">
-                <a:latin typeface="+mn-lt"/>
-              </a:rPr>
-              <a:t>allow quickly </a:t>
-            </a:r>
-            <a:r>
-              <a:rPr lang="en-US" dirty="0">
-                <a:latin typeface="+mn-lt"/>
-              </a:rPr>
-              <a:t>test and deploy </a:t>
-            </a:r>
-            <a:r>
-              <a:rPr lang="en-US" dirty="0" smtClean="0">
-                <a:latin typeface="+mn-lt"/>
-              </a:rPr>
-              <a:t>new versions of services.</a:t>
-            </a:r>
-          </a:p>
-          <a:p>
-            <a:pPr marL="900000" indent="-342900">
-              <a:buFont typeface="Arial" charset="0"/>
-              <a:buChar char="•"/>
-            </a:pPr>
-            <a:r>
-              <a:rPr lang="en-US" dirty="0" smtClean="0">
-                <a:latin typeface="+mn-lt"/>
-              </a:rPr>
-              <a:t>Images </a:t>
-            </a:r>
-            <a:r>
-              <a:rPr lang="en-US" dirty="0">
-                <a:latin typeface="+mn-lt"/>
-              </a:rPr>
-              <a:t>are p</a:t>
-            </a:r>
-            <a:r>
-              <a:rPr lang="en-US" dirty="0" smtClean="0">
-                <a:latin typeface="+mn-lt"/>
-              </a:rPr>
-              <a:t>ublicly accessible at the </a:t>
-            </a:r>
-            <a:r>
-              <a:rPr lang="en-US" b="1" dirty="0" smtClean="0">
-                <a:latin typeface="+mn-lt"/>
-              </a:rPr>
-              <a:t>Docker Hub </a:t>
-            </a:r>
-            <a:r>
-              <a:rPr lang="en-US" dirty="0" smtClean="0">
-                <a:latin typeface="+mn-lt"/>
-              </a:rPr>
-              <a:t>registry.</a:t>
-            </a:r>
-            <a:endParaRPr lang="ru-RU" dirty="0" smtClean="0">
-              <a:latin typeface="+mn-lt"/>
-            </a:endParaRPr>
-          </a:p>
-          <a:p>
-            <a:pPr marL="900000" indent="-342900">
-              <a:buFont typeface="Arial" charset="0"/>
-              <a:buChar char="•"/>
-            </a:pPr>
-            <a:r>
-              <a:rPr lang="en-US" dirty="0" smtClean="0">
-                <a:latin typeface="+mn-lt"/>
-              </a:rPr>
-              <a:t>Current infrastructure relies on </a:t>
-            </a:r>
-            <a:r>
-              <a:rPr lang="en-US" b="1" dirty="0" smtClean="0">
-                <a:latin typeface="+mn-lt"/>
-              </a:rPr>
-              <a:t>CERN services </a:t>
-            </a:r>
-            <a:r>
-              <a:rPr lang="en-US" dirty="0" smtClean="0">
-                <a:latin typeface="+mn-lt"/>
-              </a:rPr>
-              <a:t>like OpenStack Cloud, Database On Demand and</a:t>
-            </a:r>
-            <a:r>
-              <a:rPr lang="ru-RU" dirty="0" smtClean="0">
-                <a:latin typeface="+mn-lt"/>
-              </a:rPr>
-              <a:t> </a:t>
-            </a:r>
-            <a:r>
-              <a:rPr lang="en-US" dirty="0" smtClean="0">
-                <a:latin typeface="+mn-lt"/>
-              </a:rPr>
-              <a:t>Foreman for control virtual machines</a:t>
-            </a:r>
-            <a:endParaRPr lang="en-US" dirty="0">
-              <a:latin typeface="+mn-lt"/>
-            </a:endParaRPr>
-          </a:p>
-        </p:txBody>
-      </p:sp>
-      <p:sp>
-        <p:nvSpPr>
-          <p:cNvPr id="27" name="TextBox 26"/>
-          <p:cNvSpPr txBox="1"/>
-          <p:nvPr/>
-        </p:nvSpPr>
-        <p:spPr>
-          <a:xfrm>
-            <a:off x="19426125" y="32280807"/>
-            <a:ext cx="10458879" cy="3046988"/>
-          </a:xfrm>
-          <a:prstGeom prst="rect">
-            <a:avLst/>
-          </a:prstGeom>
-          <a:solidFill>
-            <a:srgbClr val="E6BB2F"/>
-          </a:solidFill>
-        </p:spPr>
-        <p:txBody>
-          <a:bodyPr wrap="square" rtlCol="0">
-            <a:spAutoFit/>
-          </a:bodyPr>
-          <a:lstStyle/>
-          <a:p>
-            <a:pPr marL="900000" indent="-342900">
-              <a:buFont typeface="Arial" charset="0"/>
-              <a:buChar char="•"/>
-            </a:pPr>
-            <a:r>
-              <a:rPr lang="en-US" dirty="0" smtClean="0">
-                <a:latin typeface="+mn-lt"/>
-              </a:rPr>
-              <a:t>Web frontend is a javascript single-page application that is composed of </a:t>
-            </a:r>
-            <a:r>
-              <a:rPr lang="en-US" b="1" dirty="0" smtClean="0">
-                <a:latin typeface="+mn-lt"/>
-              </a:rPr>
-              <a:t>analysis modules </a:t>
-            </a:r>
-            <a:r>
-              <a:rPr lang="en-US" dirty="0" smtClean="0">
-                <a:latin typeface="+mn-lt"/>
-              </a:rPr>
-              <a:t>for presenting specific logic and views for inspecting test results.</a:t>
-            </a:r>
-          </a:p>
-          <a:p>
-            <a:pPr marL="900000" indent="-342900">
-              <a:buFont typeface="Arial" charset="0"/>
-              <a:buChar char="•"/>
-            </a:pPr>
-            <a:r>
-              <a:rPr lang="en-US" dirty="0" smtClean="0">
-                <a:latin typeface="+mn-lt"/>
-              </a:rPr>
-              <a:t>Each analysis module is an </a:t>
-            </a:r>
-            <a:r>
-              <a:rPr lang="en-US" b="1" dirty="0" smtClean="0">
-                <a:latin typeface="+mn-lt"/>
-              </a:rPr>
-              <a:t>application </a:t>
-            </a:r>
-            <a:r>
-              <a:rPr lang="en-US" b="1" dirty="0" smtClean="0">
-                <a:latin typeface="+mn-lt"/>
-              </a:rPr>
-              <a:t>extension </a:t>
-            </a:r>
-            <a:r>
-              <a:rPr lang="en-US" dirty="0" smtClean="0">
-                <a:latin typeface="+mn-lt"/>
-              </a:rPr>
-              <a:t>and can be simply added or removed without  breaking the main application</a:t>
-            </a:r>
-          </a:p>
-          <a:p>
-            <a:pPr marL="900000" indent="-342900">
-              <a:buFont typeface="Arial" charset="0"/>
-              <a:buChar char="•"/>
-            </a:pPr>
-            <a:r>
-              <a:rPr lang="en-US" dirty="0" smtClean="0">
-                <a:latin typeface="+mn-lt"/>
-              </a:rPr>
-              <a:t>Common </a:t>
-            </a:r>
-            <a:r>
-              <a:rPr lang="en-US" b="1" dirty="0" smtClean="0">
-                <a:latin typeface="+mn-lt"/>
-              </a:rPr>
-              <a:t>web components </a:t>
-            </a:r>
-            <a:r>
-              <a:rPr lang="en-US" dirty="0" smtClean="0">
-                <a:latin typeface="+mn-lt"/>
-              </a:rPr>
-              <a:t>are provided for building modules. For example, search jobs and draw histograms.</a:t>
-            </a:r>
-          </a:p>
-          <a:p>
-            <a:pPr marL="342900" indent="-342900">
-              <a:buFont typeface="Arial" charset="0"/>
-              <a:buChar char="•"/>
-            </a:pPr>
-            <a:endParaRPr lang="en-US" dirty="0">
-              <a:latin typeface="+mn-lt"/>
-            </a:endParaRPr>
-          </a:p>
-        </p:txBody>
-      </p:sp>
-      <p:sp>
-        <p:nvSpPr>
-          <p:cNvPr id="122" name="Text Box 7"/>
-          <p:cNvSpPr txBox="1">
-            <a:spLocks noChangeArrowheads="1"/>
-          </p:cNvSpPr>
-          <p:nvPr/>
-        </p:nvSpPr>
-        <p:spPr bwMode="auto">
-          <a:xfrm>
-            <a:off x="982662" y="35559203"/>
-            <a:ext cx="17974467" cy="1496473"/>
-          </a:xfrm>
-          <a:prstGeom prst="rect">
-            <a:avLst/>
-          </a:prstGeom>
-          <a:solidFill>
-            <a:schemeClr val="hlink"/>
-          </a:solidFill>
-          <a:ln w="9525">
-            <a:noFill/>
-            <a:miter lim="800000"/>
-            <a:headEnd/>
-            <a:tailEnd/>
-          </a:ln>
-        </p:spPr>
-        <p:txBody>
-          <a:bodyPr wrap="square" lIns="360000" tIns="360000" rIns="360000" bIns="360000">
-            <a:spAutoFit/>
-          </a:bodyPr>
-          <a:lstStyle/>
-          <a:p>
-            <a:pPr eaLnBrk="0" hangingPunct="0">
-              <a:spcBef>
-                <a:spcPct val="50000"/>
-              </a:spcBef>
-            </a:pPr>
-            <a:r>
-              <a:rPr lang="en-US" sz="5000" b="1" dirty="0">
-                <a:solidFill>
-                  <a:schemeClr val="bg1"/>
-                </a:solidFill>
-                <a:latin typeface="Arial" charset="0"/>
-              </a:rPr>
-              <a:t>6</a:t>
-            </a:r>
-            <a:r>
-              <a:rPr lang="en-US" sz="5000" b="1" dirty="0" smtClean="0">
-                <a:solidFill>
-                  <a:schemeClr val="bg1"/>
-                </a:solidFill>
-                <a:latin typeface="Arial" charset="0"/>
-              </a:rPr>
-              <a:t>. </a:t>
-            </a:r>
-            <a:r>
-              <a:rPr lang="en-US" sz="5000" b="1" dirty="0" smtClean="0">
-                <a:solidFill>
-                  <a:schemeClr val="bg1"/>
-                </a:solidFill>
-                <a:latin typeface="Arial" charset="0"/>
-              </a:rPr>
-              <a:t>API </a:t>
-            </a:r>
-            <a:r>
-              <a:rPr lang="en-US" sz="5000" b="1" dirty="0" smtClean="0">
-                <a:solidFill>
-                  <a:schemeClr val="bg1"/>
-                </a:solidFill>
-                <a:latin typeface="Arial" charset="0"/>
-              </a:rPr>
-              <a:t>Service</a:t>
-            </a:r>
-            <a:endParaRPr lang="en-US" sz="5000" b="1" dirty="0">
-              <a:solidFill>
-                <a:schemeClr val="bg1"/>
-              </a:solidFill>
-              <a:latin typeface="Arial" charset="0"/>
-            </a:endParaRPr>
-          </a:p>
-        </p:txBody>
-      </p:sp>
-      <p:sp>
-        <p:nvSpPr>
-          <p:cNvPr id="124" name="TextBox 123"/>
-          <p:cNvSpPr txBox="1"/>
-          <p:nvPr/>
-        </p:nvSpPr>
-        <p:spPr>
-          <a:xfrm>
-            <a:off x="982663" y="37054152"/>
-            <a:ext cx="17974466" cy="5940000"/>
-          </a:xfrm>
-          <a:prstGeom prst="rect">
-            <a:avLst/>
-          </a:prstGeom>
-          <a:solidFill>
-            <a:srgbClr val="49C9CD"/>
-          </a:solidFill>
-        </p:spPr>
-        <p:txBody>
-          <a:bodyPr wrap="square" rtlCol="0" anchor="t">
-            <a:spAutoFit/>
-          </a:bodyPr>
-          <a:lstStyle/>
-          <a:p>
-            <a:endParaRPr lang="en-US" sz="2800" dirty="0" smtClean="0">
-              <a:latin typeface="+mn-lt"/>
-            </a:endParaRPr>
-          </a:p>
-          <a:p>
-            <a:endParaRPr lang="en-US" sz="2800" dirty="0">
-              <a:latin typeface="+mn-lt"/>
-            </a:endParaRPr>
-          </a:p>
-          <a:p>
-            <a:endParaRPr lang="en-US" sz="2800" dirty="0" smtClean="0">
-              <a:latin typeface="+mn-lt"/>
-            </a:endParaRPr>
-          </a:p>
-          <a:p>
-            <a:endParaRPr lang="en-US" sz="2800" dirty="0">
-              <a:latin typeface="+mn-lt"/>
-            </a:endParaRPr>
-          </a:p>
-          <a:p>
-            <a:endParaRPr lang="en-US" sz="2800" dirty="0" smtClean="0">
-              <a:latin typeface="+mn-lt"/>
-            </a:endParaRPr>
-          </a:p>
-          <a:p>
-            <a:endParaRPr lang="en-US" sz="2800" dirty="0">
-              <a:latin typeface="+mn-lt"/>
-            </a:endParaRPr>
-          </a:p>
-          <a:p>
-            <a:endParaRPr lang="en-US" sz="2800" dirty="0" smtClean="0">
-              <a:latin typeface="+mn-lt"/>
-            </a:endParaRPr>
-          </a:p>
-          <a:p>
-            <a:endParaRPr lang="en-US" sz="2800" dirty="0">
-              <a:latin typeface="+mn-lt"/>
-            </a:endParaRPr>
-          </a:p>
-          <a:p>
-            <a:endParaRPr lang="en-US" sz="2800" dirty="0" smtClean="0">
-              <a:latin typeface="+mn-lt"/>
-            </a:endParaRPr>
-          </a:p>
-          <a:p>
-            <a:endParaRPr lang="en-US" sz="2800" dirty="0">
-              <a:latin typeface="+mn-lt"/>
-            </a:endParaRPr>
-          </a:p>
-          <a:p>
-            <a:endParaRPr lang="en-US" sz="2800" dirty="0" smtClean="0">
-              <a:latin typeface="+mn-lt"/>
-            </a:endParaRPr>
-          </a:p>
-          <a:p>
-            <a:endParaRPr lang="en-US" sz="2800" dirty="0">
-              <a:latin typeface="+mn-lt"/>
-            </a:endParaRPr>
-          </a:p>
-          <a:p>
-            <a:endParaRPr lang="ru-RU" sz="2800" dirty="0" smtClean="0">
-              <a:latin typeface="+mn-lt"/>
-            </a:endParaRPr>
-          </a:p>
-        </p:txBody>
-      </p:sp>
-      <p:pic>
-        <p:nvPicPr>
-          <p:cNvPr id="28" name="Picture 27"/>
-          <p:cNvPicPr>
-            <a:picLocks noChangeAspect="1"/>
-          </p:cNvPicPr>
-          <p:nvPr/>
-        </p:nvPicPr>
-        <p:blipFill>
-          <a:blip r:embed="rId9">
-            <a:extLst>
-              <a:ext uri="{28A0092B-C50C-407E-A947-70E740481C1C}">
-                <a14:useLocalDpi xmlns:a14="http://schemas.microsoft.com/office/drawing/2010/main" val="0"/>
-              </a:ext>
-            </a:extLst>
-          </a:blip>
-          <a:stretch>
-            <a:fillRect/>
-          </a:stretch>
-        </p:blipFill>
-        <p:spPr>
-          <a:xfrm>
             <a:off x="1271080" y="37235067"/>
             <a:ext cx="6172200" cy="5480979"/>
           </a:xfrm>
@@ -6305,13 +6203,7 @@
               <a:rPr lang="en-US" dirty="0" smtClean="0">
                 <a:latin typeface="+mn-lt"/>
               </a:rPr>
-              <a:t>Provides </a:t>
-            </a:r>
-            <a:r>
-              <a:rPr lang="en-US" dirty="0" smtClean="0">
-                <a:latin typeface="+mn-lt"/>
-              </a:rPr>
-              <a:t>access to the </a:t>
+              <a:t>Provides access to the </a:t>
             </a:r>
             <a:r>
               <a:rPr lang="en-US" b="1" dirty="0" smtClean="0">
@@ -6508,13 +6400,7 @@
               <a:rPr lang="en-US" sz="2800" dirty="0" smtClean="0">
                 <a:latin typeface="+mn-lt"/>
               </a:rPr>
-              <a:t>LHCbPR </a:t>
-            </a:r>
-            <a:r>
-              <a:rPr lang="en-US" sz="2800" dirty="0" smtClean="0">
-                <a:latin typeface="+mn-lt"/>
-              </a:rPr>
-              <a:t>not coupled to the LHCb software stack and can be adapted for other experiments and projects</a:t>
+              <a:t>LHCbPR not coupled to the LHCb software stack and can be adapted for other experiments and projects</a:t>
             </a:r>
           </a:p>
           <a:p>
@@ -6558,20 +6444,7 @@
                 <a:effectLst/>
                 <a:latin typeface="+mn-lt"/>
               </a:rPr>
-              <a:t> are working on extending repository of web components and  analysis modules for web frontend</a:t>
-            </a:r>
-            <a:r>
-              <a:rPr kumimoji="0" lang="en-US" sz="2800" b="0" i="0" u="none" strike="noStrike" cap="none" normalizeH="0" dirty="0" smtClean="0">
-                <a:ln>
-                  <a:noFill/>
-                </a:ln>
-                <a:solidFill>
-                  <a:schemeClr val="tx1"/>
-                </a:solidFill>
-                <a:effectLst/>
-                <a:latin typeface="+mn-lt"/>
-              </a:rPr>
-              <a:t>.</a:t>
+              <a:t> are working on extending repository of web components and  analysis modules for web frontend.</a:t>
             </a:r>
           </a:p>
           <a:p>
@@ -7412,7 +7285,67 @@
       </p:sp>
       <p:pic>
         <p:nvPicPr>
-          <p:cNvPr id="17" name="Picture 16"/>
+          <p:cNvPr id="6" name="Picture 5"/>
+          <p:cNvPicPr>
+            <a:picLocks noChangeAspect="1"/>
+          </p:cNvPicPr>
+          <p:nvPr/>
+        </p:nvPicPr>
+        <p:blipFill>
+          <a:blip r:embed="rId8">
+            <a:extLst>
+              <a:ext uri="{28A0092B-C50C-407E-A947-70E740481C1C}">
+                <a14:useLocalDpi xmlns:a14="http://schemas.microsoft.com/office/drawing/2010/main" val="0"/>
+              </a:ext>
+            </a:extLst>
+          </a:blip>
+          <a:stretch>
+            <a:fillRect/>
+          </a:stretch>
+        </p:blipFill>
+        <p:spPr>
+          <a:xfrm>
+            <a:off x="19630500" y="22928360"/>
+            <a:ext cx="10015314" cy="5025383"/>
+          </a:xfrm>
+          <a:prstGeom prst="rect">
+            <a:avLst/>
+          </a:prstGeom>
+        </p:spPr>
+      </p:pic>
+      <p:pic>
+        <p:nvPicPr>
+          <p:cNvPr id="7" name="Picture 6"/>
+          <p:cNvPicPr>
+            <a:picLocks noChangeAspect="1"/>
+          </p:cNvPicPr>
+          <p:nvPr/>
+        </p:nvPicPr>
+        <p:blipFill>
+          <a:blip r:embed="rId9">
+            <a:extLst>
+              <a:ext uri="{28A0092B-C50C-407E-A947-70E740481C1C}">
+                <a14:useLocalDpi xmlns:a14="http://schemas.microsoft.com/office/drawing/2010/main" val="0"/>
+              </a:ext>
+            </a:extLst>
+          </a:blip>
+          <a:stretch>
+            <a:fillRect/>
+          </a:stretch>
+        </p:blipFill>
+        <p:spPr>
+          <a:xfrm>
+            <a:off x="19630500" y="28633511"/>
+            <a:ext cx="5177276" cy="6112026"/>
+          </a:xfrm>
+          <a:prstGeom prst="rect">
+            <a:avLst/>
+          </a:prstGeom>
+        </p:spPr>
+      </p:pic>
+      <p:pic>
+        <p:nvPicPr>
+          <p:cNvPr id="9" name="Picture 8"/>
           <p:cNvPicPr>
             <a:picLocks noChangeAspect="1"/>
           </p:cNvPicPr>
@@ -7426,7 +7359,7 @@
         </p:blipFill>
         <p:spPr>
           <a:xfrm>
-            <a:off x="10936288" y="22221411"/>
+            <a:off x="10935880" y="22171993"/>
             <a:ext cx="6756400" cy="8267700"/>
           </a:xfrm>
           <a:prstGeom prst="rect">

</xml_diff>